<commit_message>
Re-structuring things a bit
</commit_message>
<xml_diff>
--- a/OpenCafeTraining-Part2.pptx
+++ b/OpenCafeTraining-Part2.pptx
@@ -7120,6 +7120,12 @@
           <a:p>
             <a:r>
               <a:rPr lang="en-US" sz="1800" dirty="0"/>
+              <a:t>When should you do this?</a:t>
+            </a:r>
+          </a:p>
+          <a:p>
+            <a:r>
+              <a:rPr lang="en-US" sz="1800" dirty="0"/>
               <a:t>Demo</a:t>
             </a:r>
           </a:p>

</xml_diff>